<commit_message>
Git PPT related to structure created
</commit_message>
<xml_diff>
--- a/GIT Repository Structure - Source Control management.pptx
+++ b/GIT Repository Structure - Source Control management.pptx
@@ -2064,6 +2064,13 @@
         </dgm:presLayoutVars>
       </dgm:prSet>
       <dgm:spPr/>
+      <dgm:t>
+        <a:bodyPr/>
+        <a:lstStyle/>
+        <a:p>
+          <a:endParaRPr lang="en-US"/>
+        </a:p>
+      </dgm:t>
     </dgm:pt>
     <dgm:pt modelId="{B721543E-8E88-4135-B548-3B2D1E0290CD}" type="pres">
       <dgm:prSet presAssocID="{C82321AA-3C7E-4ECC-8289-11BF13C3C570}" presName="linNode" presStyleCnt="0"/>
@@ -2076,6 +2083,13 @@
         </dgm:presLayoutVars>
       </dgm:prSet>
       <dgm:spPr/>
+      <dgm:t>
+        <a:bodyPr/>
+        <a:lstStyle/>
+        <a:p>
+          <a:endParaRPr lang="en-US"/>
+        </a:p>
+      </dgm:t>
     </dgm:pt>
     <dgm:pt modelId="{15BBC755-A444-42BD-B5FC-BDE333685E1B}" type="pres">
       <dgm:prSet presAssocID="{C82321AA-3C7E-4ECC-8289-11BF13C3C570}" presName="childShp" presStyleLbl="bgAccFollowNode1" presStyleIdx="0" presStyleCnt="1">
@@ -2094,31 +2108,31 @@
     </dgm:pt>
   </dgm:ptLst>
   <dgm:cxnLst>
+    <dgm:cxn modelId="{403BA283-1476-4C51-A50C-3DEA495AA5EE}" type="presOf" srcId="{2A8802A8-5670-45A7-A5B0-D22FB3850EED}" destId="{15BBC755-A444-42BD-B5FC-BDE333685E1B}" srcOrd="0" destOrd="5" presId="urn:microsoft.com/office/officeart/2005/8/layout/vList6"/>
+    <dgm:cxn modelId="{37AF6992-54EC-4AE7-BD5F-6436A1FE7312}" type="presOf" srcId="{1840E805-9562-46F5-9322-F1FB07AAA6BF}" destId="{15BBC755-A444-42BD-B5FC-BDE333685E1B}" srcOrd="0" destOrd="10" presId="urn:microsoft.com/office/officeart/2005/8/layout/vList6"/>
+    <dgm:cxn modelId="{796A9560-8D7F-4418-988F-F050A4AE734B}" srcId="{C82321AA-3C7E-4ECC-8289-11BF13C3C570}" destId="{10EB9DB6-D36B-45B9-A93A-30869708A24E}" srcOrd="6" destOrd="0" parTransId="{286E60BC-04D4-408E-97FB-2B753E6992F5}" sibTransId="{47DC3DF8-A04C-4A5D-9308-A5633B173935}"/>
+    <dgm:cxn modelId="{AEF22719-A591-46B4-9D70-46F3DDB23858}" srcId="{C82321AA-3C7E-4ECC-8289-11BF13C3C570}" destId="{9851D150-E257-4BB0-94A4-B0C8B5882226}" srcOrd="0" destOrd="0" parTransId="{9AD403C2-83A0-4204-8989-83D84925B8C3}" sibTransId="{F6612808-392F-45ED-8C81-A29C4679F280}"/>
+    <dgm:cxn modelId="{2E2A698B-2F30-4E04-BD07-B2570BB06F73}" type="presOf" srcId="{9851D150-E257-4BB0-94A4-B0C8B5882226}" destId="{15BBC755-A444-42BD-B5FC-BDE333685E1B}" srcOrd="0" destOrd="0" presId="urn:microsoft.com/office/officeart/2005/8/layout/vList6"/>
+    <dgm:cxn modelId="{4546905E-6746-4AA4-BF8F-021C968EA665}" srcId="{C82321AA-3C7E-4ECC-8289-11BF13C3C570}" destId="{578290D9-ED5E-4E50-8947-4C1638F27201}" srcOrd="8" destOrd="0" parTransId="{902E9FA0-A1B1-4F5D-AB5F-D7BEFAF2C282}" sibTransId="{008030F5-19C0-4BB8-87DD-E18F73E9A4D7}"/>
+    <dgm:cxn modelId="{39A777C6-86CF-4F73-A469-F88F5E84C012}" srcId="{C82321AA-3C7E-4ECC-8289-11BF13C3C570}" destId="{1840E805-9562-46F5-9322-F1FB07AAA6BF}" srcOrd="10" destOrd="0" parTransId="{1C58DC67-2F59-446C-B316-64DE73BE9C00}" sibTransId="{80333ED3-FFB1-4CFE-A888-28396E4FB11D}"/>
+    <dgm:cxn modelId="{AFEE46E0-0807-4264-9517-F4E570DFB79E}" type="presOf" srcId="{C82321AA-3C7E-4ECC-8289-11BF13C3C570}" destId="{51441755-D088-4DCC-942A-22C063C00842}" srcOrd="0" destOrd="0" presId="urn:microsoft.com/office/officeart/2005/8/layout/vList6"/>
+    <dgm:cxn modelId="{62362F77-57F6-478F-B7E8-8365C9FE022F}" srcId="{C82321AA-3C7E-4ECC-8289-11BF13C3C570}" destId="{F7AEF6F7-C759-4BD8-817E-ADA6B35C6035}" srcOrd="9" destOrd="0" parTransId="{2F9B44CE-D42C-41C7-BA08-B444DCB7C161}" sibTransId="{17DCB798-F13E-4252-8074-4A6A5AAEFCB9}"/>
+    <dgm:cxn modelId="{6E47CB30-28DD-4399-A798-BF016D74C89D}" type="presOf" srcId="{BACC62CE-5C68-4975-9047-98623552FB4D}" destId="{15BBC755-A444-42BD-B5FC-BDE333685E1B}" srcOrd="0" destOrd="2" presId="urn:microsoft.com/office/officeart/2005/8/layout/vList6"/>
+    <dgm:cxn modelId="{CEBEE05E-C182-46CA-9288-8FE3FBC25EEE}" srcId="{C82321AA-3C7E-4ECC-8289-11BF13C3C570}" destId="{CBF5CD4C-1C8D-4A9A-8885-46ECBDAA693C}" srcOrd="1" destOrd="0" parTransId="{A37A3832-FF3C-4A39-991F-CC3186329BD6}" sibTransId="{77B6167C-69A5-4C32-9CCA-C45910847A1C}"/>
+    <dgm:cxn modelId="{B8022A91-E192-41A2-87B8-080CDDB21D40}" srcId="{C82321AA-3C7E-4ECC-8289-11BF13C3C570}" destId="{2A8802A8-5670-45A7-A5B0-D22FB3850EED}" srcOrd="5" destOrd="0" parTransId="{BF100658-53A5-449C-84E5-58F8EFCD5F43}" sibTransId="{92CDDD53-1ACA-47D6-871D-2D826AC2C4E6}"/>
+    <dgm:cxn modelId="{B61A30F3-0EA5-46EF-95EA-5DC664D7F7B5}" type="presOf" srcId="{AA6760EE-B473-42FA-983C-064A6FF3A7B4}" destId="{B09EFE29-E387-4F7B-92DA-ED8A394BD422}" srcOrd="0" destOrd="0" presId="urn:microsoft.com/office/officeart/2005/8/layout/vList6"/>
+    <dgm:cxn modelId="{D9268E68-3C2B-45A7-8022-D43F8FA6156A}" type="presOf" srcId="{578290D9-ED5E-4E50-8947-4C1638F27201}" destId="{15BBC755-A444-42BD-B5FC-BDE333685E1B}" srcOrd="0" destOrd="8" presId="urn:microsoft.com/office/officeart/2005/8/layout/vList6"/>
+    <dgm:cxn modelId="{AFACA760-5E7E-47A1-AD28-B57B22762629}" type="presOf" srcId="{10EB9DB6-D36B-45B9-A93A-30869708A24E}" destId="{15BBC755-A444-42BD-B5FC-BDE333685E1B}" srcOrd="0" destOrd="6" presId="urn:microsoft.com/office/officeart/2005/8/layout/vList6"/>
+    <dgm:cxn modelId="{5E9D2A22-A97D-4046-9BAC-507E3885F614}" type="presOf" srcId="{4F16AB85-0D0C-4ED4-A32B-7E7C0182A6F1}" destId="{15BBC755-A444-42BD-B5FC-BDE333685E1B}" srcOrd="0" destOrd="7" presId="urn:microsoft.com/office/officeart/2005/8/layout/vList6"/>
+    <dgm:cxn modelId="{708FBD26-F4B6-41B0-BA86-0BA5BDD9354F}" type="presOf" srcId="{A6151D54-5DC5-4315-91FD-67889D6F884B}" destId="{15BBC755-A444-42BD-B5FC-BDE333685E1B}" srcOrd="0" destOrd="3" presId="urn:microsoft.com/office/officeart/2005/8/layout/vList6"/>
+    <dgm:cxn modelId="{19F43DB8-FD95-4934-8B4D-9C1D3C573019}" srcId="{C82321AA-3C7E-4ECC-8289-11BF13C3C570}" destId="{A6151D54-5DC5-4315-91FD-67889D6F884B}" srcOrd="3" destOrd="0" parTransId="{9C9C30A6-06CC-4A65-A80A-406F9533D202}" sibTransId="{58742781-A743-4B9E-BF64-80CB27F7E3D7}"/>
+    <dgm:cxn modelId="{A94CB09B-1F5A-4C14-80E2-77459B610E5D}" type="presOf" srcId="{CBF5CD4C-1C8D-4A9A-8885-46ECBDAA693C}" destId="{15BBC755-A444-42BD-B5FC-BDE333685E1B}" srcOrd="0" destOrd="1" presId="urn:microsoft.com/office/officeart/2005/8/layout/vList6"/>
+    <dgm:cxn modelId="{9742E2BE-82C1-46EC-B666-6560A1CC6A3D}" srcId="{AA6760EE-B473-42FA-983C-064A6FF3A7B4}" destId="{C82321AA-3C7E-4ECC-8289-11BF13C3C570}" srcOrd="0" destOrd="0" parTransId="{EB767682-B5C0-4B1A-A09B-EDF43B502FD5}" sibTransId="{F2EF16EB-EC99-43FB-9469-D8690A18CB76}"/>
+    <dgm:cxn modelId="{3337C8D7-A06F-49FA-8377-C9FA92F1ABC6}" type="presOf" srcId="{8A87BB47-5A3C-42DD-8244-374BD669296F}" destId="{15BBC755-A444-42BD-B5FC-BDE333685E1B}" srcOrd="0" destOrd="4" presId="urn:microsoft.com/office/officeart/2005/8/layout/vList6"/>
+    <dgm:cxn modelId="{939E1BFC-83F2-4F3B-8BD0-CE6207577BA7}" srcId="{C82321AA-3C7E-4ECC-8289-11BF13C3C570}" destId="{4F16AB85-0D0C-4ED4-A32B-7E7C0182A6F1}" srcOrd="7" destOrd="0" parTransId="{7851F449-7761-48BD-9290-6646732D3279}" sibTransId="{723E7147-4C09-4298-A816-76F97052402E}"/>
+    <dgm:cxn modelId="{044D631A-ADCE-4455-8C65-FDE31FE22F20}" srcId="{C82321AA-3C7E-4ECC-8289-11BF13C3C570}" destId="{BACC62CE-5C68-4975-9047-98623552FB4D}" srcOrd="2" destOrd="0" parTransId="{BFCF026D-EB92-475C-90AF-31775F4C81B0}" sibTransId="{A245BDD6-98AB-425F-A8FE-BC21A1F2B08B}"/>
     <dgm:cxn modelId="{1D173D88-C938-4DCC-A58C-F309D032D847}" type="presOf" srcId="{F7AEF6F7-C759-4BD8-817E-ADA6B35C6035}" destId="{15BBC755-A444-42BD-B5FC-BDE333685E1B}" srcOrd="0" destOrd="9" presId="urn:microsoft.com/office/officeart/2005/8/layout/vList6"/>
-    <dgm:cxn modelId="{B61A30F3-0EA5-46EF-95EA-5DC664D7F7B5}" type="presOf" srcId="{AA6760EE-B473-42FA-983C-064A6FF3A7B4}" destId="{B09EFE29-E387-4F7B-92DA-ED8A394BD422}" srcOrd="0" destOrd="0" presId="urn:microsoft.com/office/officeart/2005/8/layout/vList6"/>
-    <dgm:cxn modelId="{A94CB09B-1F5A-4C14-80E2-77459B610E5D}" type="presOf" srcId="{CBF5CD4C-1C8D-4A9A-8885-46ECBDAA693C}" destId="{15BBC755-A444-42BD-B5FC-BDE333685E1B}" srcOrd="0" destOrd="1" presId="urn:microsoft.com/office/officeart/2005/8/layout/vList6"/>
-    <dgm:cxn modelId="{5E9D2A22-A97D-4046-9BAC-507E3885F614}" type="presOf" srcId="{4F16AB85-0D0C-4ED4-A32B-7E7C0182A6F1}" destId="{15BBC755-A444-42BD-B5FC-BDE333685E1B}" srcOrd="0" destOrd="7" presId="urn:microsoft.com/office/officeart/2005/8/layout/vList6"/>
-    <dgm:cxn modelId="{62362F77-57F6-478F-B7E8-8365C9FE022F}" srcId="{C82321AA-3C7E-4ECC-8289-11BF13C3C570}" destId="{F7AEF6F7-C759-4BD8-817E-ADA6B35C6035}" srcOrd="9" destOrd="0" parTransId="{2F9B44CE-D42C-41C7-BA08-B444DCB7C161}" sibTransId="{17DCB798-F13E-4252-8074-4A6A5AAEFCB9}"/>
-    <dgm:cxn modelId="{708FBD26-F4B6-41B0-BA86-0BA5BDD9354F}" type="presOf" srcId="{A6151D54-5DC5-4315-91FD-67889D6F884B}" destId="{15BBC755-A444-42BD-B5FC-BDE333685E1B}" srcOrd="0" destOrd="3" presId="urn:microsoft.com/office/officeart/2005/8/layout/vList6"/>
-    <dgm:cxn modelId="{4546905E-6746-4AA4-BF8F-021C968EA665}" srcId="{C82321AA-3C7E-4ECC-8289-11BF13C3C570}" destId="{578290D9-ED5E-4E50-8947-4C1638F27201}" srcOrd="8" destOrd="0" parTransId="{902E9FA0-A1B1-4F5D-AB5F-D7BEFAF2C282}" sibTransId="{008030F5-19C0-4BB8-87DD-E18F73E9A4D7}"/>
-    <dgm:cxn modelId="{B8022A91-E192-41A2-87B8-080CDDB21D40}" srcId="{C82321AA-3C7E-4ECC-8289-11BF13C3C570}" destId="{2A8802A8-5670-45A7-A5B0-D22FB3850EED}" srcOrd="5" destOrd="0" parTransId="{BF100658-53A5-449C-84E5-58F8EFCD5F43}" sibTransId="{92CDDD53-1ACA-47D6-871D-2D826AC2C4E6}"/>
-    <dgm:cxn modelId="{19F43DB8-FD95-4934-8B4D-9C1D3C573019}" srcId="{C82321AA-3C7E-4ECC-8289-11BF13C3C570}" destId="{A6151D54-5DC5-4315-91FD-67889D6F884B}" srcOrd="3" destOrd="0" parTransId="{9C9C30A6-06CC-4A65-A80A-406F9533D202}" sibTransId="{58742781-A743-4B9E-BF64-80CB27F7E3D7}"/>
     <dgm:cxn modelId="{FF09B67A-423C-45F2-83C1-E832AE812FB8}" srcId="{C82321AA-3C7E-4ECC-8289-11BF13C3C570}" destId="{8A87BB47-5A3C-42DD-8244-374BD669296F}" srcOrd="4" destOrd="0" parTransId="{6E20D8EA-03C3-4177-ACC6-79F710E382E2}" sibTransId="{B28CE7FD-5EDE-4A8E-B4CA-8CDA1E9F0158}"/>
-    <dgm:cxn modelId="{796A9560-8D7F-4418-988F-F050A4AE734B}" srcId="{C82321AA-3C7E-4ECC-8289-11BF13C3C570}" destId="{10EB9DB6-D36B-45B9-A93A-30869708A24E}" srcOrd="6" destOrd="0" parTransId="{286E60BC-04D4-408E-97FB-2B753E6992F5}" sibTransId="{47DC3DF8-A04C-4A5D-9308-A5633B173935}"/>
-    <dgm:cxn modelId="{CEBEE05E-C182-46CA-9288-8FE3FBC25EEE}" srcId="{C82321AA-3C7E-4ECC-8289-11BF13C3C570}" destId="{CBF5CD4C-1C8D-4A9A-8885-46ECBDAA693C}" srcOrd="1" destOrd="0" parTransId="{A37A3832-FF3C-4A39-991F-CC3186329BD6}" sibTransId="{77B6167C-69A5-4C32-9CCA-C45910847A1C}"/>
-    <dgm:cxn modelId="{AFACA760-5E7E-47A1-AD28-B57B22762629}" type="presOf" srcId="{10EB9DB6-D36B-45B9-A93A-30869708A24E}" destId="{15BBC755-A444-42BD-B5FC-BDE333685E1B}" srcOrd="0" destOrd="6" presId="urn:microsoft.com/office/officeart/2005/8/layout/vList6"/>
-    <dgm:cxn modelId="{D9268E68-3C2B-45A7-8022-D43F8FA6156A}" type="presOf" srcId="{578290D9-ED5E-4E50-8947-4C1638F27201}" destId="{15BBC755-A444-42BD-B5FC-BDE333685E1B}" srcOrd="0" destOrd="8" presId="urn:microsoft.com/office/officeart/2005/8/layout/vList6"/>
-    <dgm:cxn modelId="{AFEE46E0-0807-4264-9517-F4E570DFB79E}" type="presOf" srcId="{C82321AA-3C7E-4ECC-8289-11BF13C3C570}" destId="{51441755-D088-4DCC-942A-22C063C00842}" srcOrd="0" destOrd="0" presId="urn:microsoft.com/office/officeart/2005/8/layout/vList6"/>
-    <dgm:cxn modelId="{3337C8D7-A06F-49FA-8377-C9FA92F1ABC6}" type="presOf" srcId="{8A87BB47-5A3C-42DD-8244-374BD669296F}" destId="{15BBC755-A444-42BD-B5FC-BDE333685E1B}" srcOrd="0" destOrd="4" presId="urn:microsoft.com/office/officeart/2005/8/layout/vList6"/>
-    <dgm:cxn modelId="{39A777C6-86CF-4F73-A469-F88F5E84C012}" srcId="{C82321AA-3C7E-4ECC-8289-11BF13C3C570}" destId="{1840E805-9562-46F5-9322-F1FB07AAA6BF}" srcOrd="10" destOrd="0" parTransId="{1C58DC67-2F59-446C-B316-64DE73BE9C00}" sibTransId="{80333ED3-FFB1-4CFE-A888-28396E4FB11D}"/>
-    <dgm:cxn modelId="{403BA283-1476-4C51-A50C-3DEA495AA5EE}" type="presOf" srcId="{2A8802A8-5670-45A7-A5B0-D22FB3850EED}" destId="{15BBC755-A444-42BD-B5FC-BDE333685E1B}" srcOrd="0" destOrd="5" presId="urn:microsoft.com/office/officeart/2005/8/layout/vList6"/>
-    <dgm:cxn modelId="{9742E2BE-82C1-46EC-B666-6560A1CC6A3D}" srcId="{AA6760EE-B473-42FA-983C-064A6FF3A7B4}" destId="{C82321AA-3C7E-4ECC-8289-11BF13C3C570}" srcOrd="0" destOrd="0" parTransId="{EB767682-B5C0-4B1A-A09B-EDF43B502FD5}" sibTransId="{F2EF16EB-EC99-43FB-9469-D8690A18CB76}"/>
-    <dgm:cxn modelId="{2E2A698B-2F30-4E04-BD07-B2570BB06F73}" type="presOf" srcId="{9851D150-E257-4BB0-94A4-B0C8B5882226}" destId="{15BBC755-A444-42BD-B5FC-BDE333685E1B}" srcOrd="0" destOrd="0" presId="urn:microsoft.com/office/officeart/2005/8/layout/vList6"/>
-    <dgm:cxn modelId="{939E1BFC-83F2-4F3B-8BD0-CE6207577BA7}" srcId="{C82321AA-3C7E-4ECC-8289-11BF13C3C570}" destId="{4F16AB85-0D0C-4ED4-A32B-7E7C0182A6F1}" srcOrd="7" destOrd="0" parTransId="{7851F449-7761-48BD-9290-6646732D3279}" sibTransId="{723E7147-4C09-4298-A816-76F97052402E}"/>
-    <dgm:cxn modelId="{37AF6992-54EC-4AE7-BD5F-6436A1FE7312}" type="presOf" srcId="{1840E805-9562-46F5-9322-F1FB07AAA6BF}" destId="{15BBC755-A444-42BD-B5FC-BDE333685E1B}" srcOrd="0" destOrd="10" presId="urn:microsoft.com/office/officeart/2005/8/layout/vList6"/>
-    <dgm:cxn modelId="{6E47CB30-28DD-4399-A798-BF016D74C89D}" type="presOf" srcId="{BACC62CE-5C68-4975-9047-98623552FB4D}" destId="{15BBC755-A444-42BD-B5FC-BDE333685E1B}" srcOrd="0" destOrd="2" presId="urn:microsoft.com/office/officeart/2005/8/layout/vList6"/>
-    <dgm:cxn modelId="{AEF22719-A591-46B4-9D70-46F3DDB23858}" srcId="{C82321AA-3C7E-4ECC-8289-11BF13C3C570}" destId="{9851D150-E257-4BB0-94A4-B0C8B5882226}" srcOrd="0" destOrd="0" parTransId="{9AD403C2-83A0-4204-8989-83D84925B8C3}" sibTransId="{F6612808-392F-45ED-8C81-A29C4679F280}"/>
-    <dgm:cxn modelId="{044D631A-ADCE-4455-8C65-FDE31FE22F20}" srcId="{C82321AA-3C7E-4ECC-8289-11BF13C3C570}" destId="{BACC62CE-5C68-4975-9047-98623552FB4D}" srcOrd="2" destOrd="0" parTransId="{BFCF026D-EB92-475C-90AF-31775F4C81B0}" sibTransId="{A245BDD6-98AB-425F-A8FE-BC21A1F2B08B}"/>
     <dgm:cxn modelId="{17ED69BA-511A-43C9-B2F0-7570CD62F4CE}" type="presParOf" srcId="{B09EFE29-E387-4F7B-92DA-ED8A394BD422}" destId="{B721543E-8E88-4135-B548-3B2D1E0290CD}" srcOrd="0" destOrd="0" presId="urn:microsoft.com/office/officeart/2005/8/layout/vList6"/>
     <dgm:cxn modelId="{B0FF9004-D9E7-49C9-B7F1-6E94F877E63C}" type="presParOf" srcId="{B721543E-8E88-4135-B548-3B2D1E0290CD}" destId="{51441755-D088-4DCC-942A-22C063C00842}" srcOrd="0" destOrd="0" presId="urn:microsoft.com/office/officeart/2005/8/layout/vList6"/>
     <dgm:cxn modelId="{5FAFBD9B-9273-4803-BD63-F777E39903AD}" type="presParOf" srcId="{B721543E-8E88-4135-B548-3B2D1E0290CD}" destId="{15BBC755-A444-42BD-B5FC-BDE333685E1B}" srcOrd="1" destOrd="0" presId="urn:microsoft.com/office/officeart/2005/8/layout/vList6"/>
@@ -2873,6 +2887,13 @@
         </dgm:presLayoutVars>
       </dgm:prSet>
       <dgm:spPr/>
+      <dgm:t>
+        <a:bodyPr/>
+        <a:lstStyle/>
+        <a:p>
+          <a:endParaRPr lang="en-US"/>
+        </a:p>
+      </dgm:t>
     </dgm:pt>
     <dgm:pt modelId="{410AFA58-CE5A-484C-A33A-A6708CFFC7F9}" type="pres">
       <dgm:prSet presAssocID="{F5325DF1-9E52-47C7-9239-AA2E693EA141}" presName="node" presStyleLbl="node1" presStyleIdx="0" presStyleCnt="3">
@@ -2930,25 +2951,25 @@
   </dgm:ptLst>
   <dgm:cxnLst>
     <dgm:cxn modelId="{5E955F33-64CD-4CBE-9360-47797653C192}" srcId="{F5325DF1-9E52-47C7-9239-AA2E693EA141}" destId="{080D2C15-81E9-483C-B61E-501550698461}" srcOrd="6" destOrd="0" parTransId="{83DA9347-F25B-48E0-A6F7-F694F92490A9}" sibTransId="{592343A7-4F7A-4B33-AC2C-431CFDE2C57D}"/>
+    <dgm:cxn modelId="{7DEBD1E0-6B60-4CAD-86ED-D570FADAFCF7}" srcId="{CE1FDA0C-4EDD-4381-83A0-38C542744BBE}" destId="{0F2B6437-D2D5-40C1-BC62-D1363CE57302}" srcOrd="5" destOrd="0" parTransId="{864F3142-A8BF-4540-BEDF-952502306121}" sibTransId="{C75D53EF-6D55-454F-8EAA-488C0F3FF27C}"/>
     <dgm:cxn modelId="{348A582C-83AA-48CE-AA4E-3414E75F350A}" type="presOf" srcId="{682944DB-415E-4F28-A4E8-97CC4B95EB2D}" destId="{410AFA58-CE5A-484C-A33A-A6708CFFC7F9}" srcOrd="0" destOrd="4" presId="urn:microsoft.com/office/officeart/2005/8/layout/hList6"/>
-    <dgm:cxn modelId="{7DEBD1E0-6B60-4CAD-86ED-D570FADAFCF7}" srcId="{CE1FDA0C-4EDD-4381-83A0-38C542744BBE}" destId="{0F2B6437-D2D5-40C1-BC62-D1363CE57302}" srcOrd="5" destOrd="0" parTransId="{864F3142-A8BF-4540-BEDF-952502306121}" sibTransId="{C75D53EF-6D55-454F-8EAA-488C0F3FF27C}"/>
     <dgm:cxn modelId="{FABD3519-DB24-4774-AC28-72BDB6E1B1CE}" srcId="{CF546C9E-18A0-44B0-9974-0A60AA5A0074}" destId="{F89EF169-B0DC-4071-9742-263E325EBFD3}" srcOrd="4" destOrd="0" parTransId="{797E46CC-6F79-47D5-ABFF-E02AE5EC0F56}" sibTransId="{630B4F52-C7C5-4FF1-976C-E181322A5D83}"/>
     <dgm:cxn modelId="{6CB3038F-01AA-4AA1-BF21-A929DC3C651E}" srcId="{F5325DF1-9E52-47C7-9239-AA2E693EA141}" destId="{06D677AE-28EF-4356-9744-4756E3E89AC8}" srcOrd="7" destOrd="0" parTransId="{C9B4AA71-6576-4D26-B4C9-0EDA3D01D764}" sibTransId="{AFD008FD-D12B-4BE9-9E31-1CCF3E8530DE}"/>
+    <dgm:cxn modelId="{83D09778-539A-44EB-9CC0-A352FC113073}" type="presOf" srcId="{33E6B61B-07A5-40C4-91D4-4EE0DCB30036}" destId="{76C85051-F993-46FE-AEF8-C1FEADB2A426}" srcOrd="0" destOrd="8" presId="urn:microsoft.com/office/officeart/2005/8/layout/hList6"/>
     <dgm:cxn modelId="{677CFFAA-4814-483D-BC62-D982FEF027EC}" srcId="{F5325DF1-9E52-47C7-9239-AA2E693EA141}" destId="{62EB95BE-09F4-4BD9-9E0E-34DD638FB655}" srcOrd="4" destOrd="0" parTransId="{6B7AAB9E-B972-43D9-8509-7C3838605B46}" sibTransId="{55400003-092D-4921-B359-02C433F7CC1F}"/>
-    <dgm:cxn modelId="{83D09778-539A-44EB-9CC0-A352FC113073}" type="presOf" srcId="{33E6B61B-07A5-40C4-91D4-4EE0DCB30036}" destId="{76C85051-F993-46FE-AEF8-C1FEADB2A426}" srcOrd="0" destOrd="8" presId="urn:microsoft.com/office/officeart/2005/8/layout/hList6"/>
     <dgm:cxn modelId="{B612CA26-5C11-46E9-9575-1C7B2027B197}" srcId="{9A83483E-00B7-4375-9CBB-031AC0298B45}" destId="{CE1FDA0C-4EDD-4381-83A0-38C542744BBE}" srcOrd="2" destOrd="0" parTransId="{ED0A1FC0-81D2-4C48-99A9-FE9EF0B4692E}" sibTransId="{597A27F0-7EE3-4BF6-A63D-289CBEBF96A3}"/>
     <dgm:cxn modelId="{9E00E868-BCBC-428C-8FA8-E8E17634CE21}" type="presOf" srcId="{137424C2-CE09-4654-BA9E-3F8D517DDE44}" destId="{76C85051-F993-46FE-AEF8-C1FEADB2A426}" srcOrd="0" destOrd="2" presId="urn:microsoft.com/office/officeart/2005/8/layout/hList6"/>
-    <dgm:cxn modelId="{B184A0EC-5C77-40D5-95A9-90F1D64CFB85}" type="presOf" srcId="{F5325DF1-9E52-47C7-9239-AA2E693EA141}" destId="{410AFA58-CE5A-484C-A33A-A6708CFFC7F9}" srcOrd="0" destOrd="0" presId="urn:microsoft.com/office/officeart/2005/8/layout/hList6"/>
     <dgm:cxn modelId="{2CFE0D5F-3517-4A74-BD45-931BC28A1461}" type="presOf" srcId="{E981E505-4C8F-4BC2-9C7C-DA6EDAD345DA}" destId="{76C85051-F993-46FE-AEF8-C1FEADB2A426}" srcOrd="0" destOrd="4" presId="urn:microsoft.com/office/officeart/2005/8/layout/hList6"/>
     <dgm:cxn modelId="{9B19FA39-3685-47EC-A203-C30CB9465FE8}" srcId="{CE1FDA0C-4EDD-4381-83A0-38C542744BBE}" destId="{137424C2-CE09-4654-BA9E-3F8D517DDE44}" srcOrd="1" destOrd="0" parTransId="{DDAC56B4-17E4-4DD7-ACD3-89426F52C1FE}" sibTransId="{1D953012-82E5-4520-A0FF-14DC18F6B97D}"/>
+    <dgm:cxn modelId="{B184A0EC-5C77-40D5-95A9-90F1D64CFB85}" type="presOf" srcId="{F5325DF1-9E52-47C7-9239-AA2E693EA141}" destId="{410AFA58-CE5A-484C-A33A-A6708CFFC7F9}" srcOrd="0" destOrd="0" presId="urn:microsoft.com/office/officeart/2005/8/layout/hList6"/>
     <dgm:cxn modelId="{A88AC1CE-606B-408B-9260-F442E2B8AD99}" type="presOf" srcId="{9A83483E-00B7-4375-9CBB-031AC0298B45}" destId="{541434BE-B824-4F4A-BB1F-9D49759E652E}" srcOrd="0" destOrd="0" presId="urn:microsoft.com/office/officeart/2005/8/layout/hList6"/>
     <dgm:cxn modelId="{4C4B80BE-A790-4529-A294-8949A59447EE}" srcId="{CF546C9E-18A0-44B0-9974-0A60AA5A0074}" destId="{2058F843-6EA9-4FBC-A1E3-99F020C0BEEB}" srcOrd="0" destOrd="0" parTransId="{9471F345-12A4-4D26-BE6B-04E29CFF389B}" sibTransId="{0F18D1E8-0994-4EF5-95DE-AFB7DA5A815A}"/>
     <dgm:cxn modelId="{D0ABEAF4-D96D-46F1-989A-46BFA20FC31A}" srcId="{CF546C9E-18A0-44B0-9974-0A60AA5A0074}" destId="{55AA50F8-CDE3-4424-93EF-619130B942BB}" srcOrd="2" destOrd="0" parTransId="{51E27305-B7F7-4FC5-9D71-727F53211EA0}" sibTransId="{A2002F36-7ED5-4FC3-8127-6176F89379E4}"/>
+    <dgm:cxn modelId="{9B3934F8-3603-442A-98A7-543A602DC0E8}" type="presOf" srcId="{4A3F6608-D5BC-4E82-B690-C0B2CB03835A}" destId="{95CB8065-E352-4C38-9523-388110994D56}" srcOrd="0" destOrd="7" presId="urn:microsoft.com/office/officeart/2005/8/layout/hList6"/>
     <dgm:cxn modelId="{1703349A-C795-4C13-A6B3-5F4CE022703F}" type="presOf" srcId="{6C823BE1-C522-41D3-9480-1737684DDA33}" destId="{410AFA58-CE5A-484C-A33A-A6708CFFC7F9}" srcOrd="0" destOrd="3" presId="urn:microsoft.com/office/officeart/2005/8/layout/hList6"/>
-    <dgm:cxn modelId="{9B3934F8-3603-442A-98A7-543A602DC0E8}" type="presOf" srcId="{4A3F6608-D5BC-4E82-B690-C0B2CB03835A}" destId="{95CB8065-E352-4C38-9523-388110994D56}" srcOrd="0" destOrd="7" presId="urn:microsoft.com/office/officeart/2005/8/layout/hList6"/>
     <dgm:cxn modelId="{341A9AE7-35BE-4D89-8C38-2A0FDBFCC3FB}" type="presOf" srcId="{83CE3F52-1D88-4718-A209-6001604CA83F}" destId="{76C85051-F993-46FE-AEF8-C1FEADB2A426}" srcOrd="0" destOrd="1" presId="urn:microsoft.com/office/officeart/2005/8/layout/hList6"/>
+    <dgm:cxn modelId="{2217DD49-4C80-4F4E-BA25-EC5A853E56AE}" srcId="{CF546C9E-18A0-44B0-9974-0A60AA5A0074}" destId="{79ED5BDF-17A8-4D1A-82A2-40A33A50F042}" srcOrd="5" destOrd="0" parTransId="{83C238CA-6B53-4D54-B937-F267BD192CA2}" sibTransId="{0B9B8153-48E2-4675-86C0-BB4E3F218CD1}"/>
     <dgm:cxn modelId="{D38C186A-EA8C-43D6-B655-A43C3132D6C4}" type="presOf" srcId="{FE62265F-007B-4A92-BC9E-CE17103D6926}" destId="{410AFA58-CE5A-484C-A33A-A6708CFFC7F9}" srcOrd="0" destOrd="6" presId="urn:microsoft.com/office/officeart/2005/8/layout/hList6"/>
-    <dgm:cxn modelId="{2217DD49-4C80-4F4E-BA25-EC5A853E56AE}" srcId="{CF546C9E-18A0-44B0-9974-0A60AA5A0074}" destId="{79ED5BDF-17A8-4D1A-82A2-40A33A50F042}" srcOrd="5" destOrd="0" parTransId="{83C238CA-6B53-4D54-B937-F267BD192CA2}" sibTransId="{0B9B8153-48E2-4675-86C0-BB4E3F218CD1}"/>
     <dgm:cxn modelId="{15442CAA-A75D-4586-B8D0-D302A1F4F3D1}" srcId="{CF546C9E-18A0-44B0-9974-0A60AA5A0074}" destId="{98C3FA39-7E20-47C6-881C-9556C2C582F6}" srcOrd="3" destOrd="0" parTransId="{39E6D1B5-C377-4DFB-ADE4-C0D54CD71479}" sibTransId="{61B3FEDA-EAC4-488D-A0CD-FC2978C7DD69}"/>
     <dgm:cxn modelId="{5D7BEBD4-12DF-40F4-B4F3-E37DA9A65454}" type="presOf" srcId="{2058F843-6EA9-4FBC-A1E3-99F020C0BEEB}" destId="{95CB8065-E352-4C38-9523-388110994D56}" srcOrd="0" destOrd="1" presId="urn:microsoft.com/office/officeart/2005/8/layout/hList6"/>
     <dgm:cxn modelId="{E36B58C9-049C-4E7F-8DE6-BA45AD7D952F}" type="presOf" srcId="{F89EF169-B0DC-4071-9742-263E325EBFD3}" destId="{95CB8065-E352-4C38-9523-388110994D56}" srcOrd="0" destOrd="5" presId="urn:microsoft.com/office/officeart/2005/8/layout/hList6"/>
@@ -2958,19 +2979,19 @@
     <dgm:cxn modelId="{15E0B5AD-17E6-4EC2-AC19-194D36B4095D}" type="presOf" srcId="{55AA50F8-CDE3-4424-93EF-619130B942BB}" destId="{95CB8065-E352-4C38-9523-388110994D56}" srcOrd="0" destOrd="3" presId="urn:microsoft.com/office/officeart/2005/8/layout/hList6"/>
     <dgm:cxn modelId="{02A12B7D-9D92-4940-9276-5418B118AE04}" type="presOf" srcId="{3404C2D7-0C76-49E7-8A4A-43BB0C3D0643}" destId="{76C85051-F993-46FE-AEF8-C1FEADB2A426}" srcOrd="0" destOrd="7" presId="urn:microsoft.com/office/officeart/2005/8/layout/hList6"/>
     <dgm:cxn modelId="{8844FA3A-33D0-478A-9B73-6B6C20E04B5A}" type="presOf" srcId="{A740C843-B789-48F5-B8D0-612BC30E0719}" destId="{410AFA58-CE5A-484C-A33A-A6708CFFC7F9}" srcOrd="0" destOrd="2" presId="urn:microsoft.com/office/officeart/2005/8/layout/hList6"/>
+    <dgm:cxn modelId="{5C325541-4511-45B1-AC32-CA7FAAF4671A}" srcId="{CE1FDA0C-4EDD-4381-83A0-38C542744BBE}" destId="{3404C2D7-0C76-49E7-8A4A-43BB0C3D0643}" srcOrd="6" destOrd="0" parTransId="{68DEF2C7-BEFA-4EE8-A694-3BD46D7A4743}" sibTransId="{C7E98C62-6CF1-412C-B6EA-AED352983D65}"/>
     <dgm:cxn modelId="{91DF77C0-E45A-48A8-9923-01ADDC1EB340}" type="presOf" srcId="{98C3FA39-7E20-47C6-881C-9556C2C582F6}" destId="{95CB8065-E352-4C38-9523-388110994D56}" srcOrd="0" destOrd="4" presId="urn:microsoft.com/office/officeart/2005/8/layout/hList6"/>
-    <dgm:cxn modelId="{5C325541-4511-45B1-AC32-CA7FAAF4671A}" srcId="{CE1FDA0C-4EDD-4381-83A0-38C542744BBE}" destId="{3404C2D7-0C76-49E7-8A4A-43BB0C3D0643}" srcOrd="6" destOrd="0" parTransId="{68DEF2C7-BEFA-4EE8-A694-3BD46D7A4743}" sibTransId="{C7E98C62-6CF1-412C-B6EA-AED352983D65}"/>
     <dgm:cxn modelId="{6A2996E0-3AC5-4AEB-AECC-A022B0A7743A}" srcId="{F5325DF1-9E52-47C7-9239-AA2E693EA141}" destId="{6C823BE1-C522-41D3-9480-1737684DDA33}" srcOrd="2" destOrd="0" parTransId="{FEA6CE4A-07F0-4E26-9483-F0E7E3438F8A}" sibTransId="{229C6159-0C2E-4DBA-A122-D2268222AD4E}"/>
     <dgm:cxn modelId="{F6EE9C09-BC88-427C-ACE9-F1D4F0C0B008}" type="presOf" srcId="{11B82AE9-CBF3-4068-A9B1-2837E51DD6C7}" destId="{95CB8065-E352-4C38-9523-388110994D56}" srcOrd="0" destOrd="8" presId="urn:microsoft.com/office/officeart/2005/8/layout/hList6"/>
     <dgm:cxn modelId="{05E673FC-EFAD-4B48-B850-9290FDF7EB34}" type="presOf" srcId="{45D7B91C-20E5-4A82-A63B-26A352158E0F}" destId="{76C85051-F993-46FE-AEF8-C1FEADB2A426}" srcOrd="0" destOrd="5" presId="urn:microsoft.com/office/officeart/2005/8/layout/hList6"/>
     <dgm:cxn modelId="{8B3D03D0-650C-43BF-916E-99B2046C726E}" srcId="{CE1FDA0C-4EDD-4381-83A0-38C542744BBE}" destId="{E981E505-4C8F-4BC2-9C7C-DA6EDAD345DA}" srcOrd="3" destOrd="0" parTransId="{A5F2111D-EE6E-4DB5-B6A5-FDB030A584E3}" sibTransId="{BC6B32E5-8BDC-4740-8607-B6F98566B855}"/>
     <dgm:cxn modelId="{9346F354-F82A-45D0-8F7C-A144C6DB4568}" srcId="{CF546C9E-18A0-44B0-9974-0A60AA5A0074}" destId="{4A3F6608-D5BC-4E82-B690-C0B2CB03835A}" srcOrd="6" destOrd="0" parTransId="{0B82DFEC-5048-42BF-B7D9-FF50F34AEE62}" sibTransId="{A4B2061F-3BFD-4A5F-9D09-441BBFD38FAB}"/>
     <dgm:cxn modelId="{AFBF198D-F1E8-4B8F-AFFB-F52D478F702D}" srcId="{F5325DF1-9E52-47C7-9239-AA2E693EA141}" destId="{FE62265F-007B-4A92-BC9E-CE17103D6926}" srcOrd="5" destOrd="0" parTransId="{DDD5EAA6-D364-44AC-B454-698BEDE70A9C}" sibTransId="{26EE7D9E-7943-43BC-8602-96BAF38FDB64}"/>
+    <dgm:cxn modelId="{D4B27766-31F6-492B-9521-46080B571696}" type="presOf" srcId="{79ED5BDF-17A8-4D1A-82A2-40A33A50F042}" destId="{95CB8065-E352-4C38-9523-388110994D56}" srcOrd="0" destOrd="6" presId="urn:microsoft.com/office/officeart/2005/8/layout/hList6"/>
     <dgm:cxn modelId="{C493CAC0-B2C0-4AA5-B5C2-15507902BCDA}" type="presOf" srcId="{62EB95BE-09F4-4BD9-9E0E-34DD638FB655}" destId="{410AFA58-CE5A-484C-A33A-A6708CFFC7F9}" srcOrd="0" destOrd="5" presId="urn:microsoft.com/office/officeart/2005/8/layout/hList6"/>
-    <dgm:cxn modelId="{D4B27766-31F6-492B-9521-46080B571696}" type="presOf" srcId="{79ED5BDF-17A8-4D1A-82A2-40A33A50F042}" destId="{95CB8065-E352-4C38-9523-388110994D56}" srcOrd="0" destOrd="6" presId="urn:microsoft.com/office/officeart/2005/8/layout/hList6"/>
     <dgm:cxn modelId="{435E890B-0FF7-4117-B301-B1BAD4980D1C}" srcId="{9A83483E-00B7-4375-9CBB-031AC0298B45}" destId="{CF546C9E-18A0-44B0-9974-0A60AA5A0074}" srcOrd="1" destOrd="0" parTransId="{B9CB6D6D-57D7-4F9D-AF60-4868773B8C01}" sibTransId="{A6B546E7-07D8-460A-BD95-1257D3E63D38}"/>
+    <dgm:cxn modelId="{02A25F74-0C4C-472B-B809-DD73A120778F}" srcId="{9A83483E-00B7-4375-9CBB-031AC0298B45}" destId="{F5325DF1-9E52-47C7-9239-AA2E693EA141}" srcOrd="0" destOrd="0" parTransId="{F0F063D6-34DC-4BA5-B2F9-D126D53C8AEB}" sibTransId="{0F036673-9ACA-415E-B9FA-1E40E9C4C9C7}"/>
     <dgm:cxn modelId="{EDF66AC5-2A98-436A-ABD2-C05DE030FB9E}" type="presOf" srcId="{0F2B6437-D2D5-40C1-BC62-D1363CE57302}" destId="{76C85051-F993-46FE-AEF8-C1FEADB2A426}" srcOrd="0" destOrd="6" presId="urn:microsoft.com/office/officeart/2005/8/layout/hList6"/>
-    <dgm:cxn modelId="{02A25F74-0C4C-472B-B809-DD73A120778F}" srcId="{9A83483E-00B7-4375-9CBB-031AC0298B45}" destId="{F5325DF1-9E52-47C7-9239-AA2E693EA141}" srcOrd="0" destOrd="0" parTransId="{F0F063D6-34DC-4BA5-B2F9-D126D53C8AEB}" sibTransId="{0F036673-9ACA-415E-B9FA-1E40E9C4C9C7}"/>
     <dgm:cxn modelId="{EA5E441F-1A5B-4BA3-80B9-3A7345EC9932}" type="presOf" srcId="{CF546C9E-18A0-44B0-9974-0A60AA5A0074}" destId="{95CB8065-E352-4C38-9523-388110994D56}" srcOrd="0" destOrd="0" presId="urn:microsoft.com/office/officeart/2005/8/layout/hList6"/>
     <dgm:cxn modelId="{2E3ADF5E-A00B-4AB9-AC09-54290C284888}" srcId="{F5325DF1-9E52-47C7-9239-AA2E693EA141}" destId="{682944DB-415E-4F28-A4E8-97CC4B95EB2D}" srcOrd="3" destOrd="0" parTransId="{96011332-7704-4DB1-AE16-9CD59F6D20E3}" sibTransId="{4A5484EB-C866-4F62-A654-49CB8A3B84A0}"/>
     <dgm:cxn modelId="{D4122F74-97CF-40F9-8649-966E3F5078A9}" type="presOf" srcId="{7C08CDE0-FD1D-47A3-B5CD-7E5E67234DAE}" destId="{76C85051-F993-46FE-AEF8-C1FEADB2A426}" srcOrd="0" destOrd="3" presId="urn:microsoft.com/office/officeart/2005/8/layout/hList6"/>
@@ -5622,7 +5643,8 @@
           <a:p>
             <a:fld id="{0D124DBC-6F7F-43B8-B6BB-3B500A0A09AB}" type="datetimeFigureOut">
               <a:rPr lang="en-US" smtClean="0"/>
-              <a:t>4/8/2018</a:t>
+              <a:pPr/>
+              <a:t>4/9/2018</a:t>
             </a:fld>
             <a:endParaRPr lang="en-US"/>
           </a:p>
@@ -5664,6 +5686,7 @@
           <a:p>
             <a:fld id="{E1619E6C-22A1-490A-A748-4B9E468C72BE}" type="slidenum">
               <a:rPr lang="en-US" smtClean="0"/>
+              <a:pPr/>
               <a:t>‹#›</a:t>
             </a:fld>
             <a:endParaRPr lang="en-US"/>
@@ -5787,7 +5810,8 @@
           <a:p>
             <a:fld id="{0D124DBC-6F7F-43B8-B6BB-3B500A0A09AB}" type="datetimeFigureOut">
               <a:rPr lang="en-US" smtClean="0"/>
-              <a:t>4/8/2018</a:t>
+              <a:pPr/>
+              <a:t>4/9/2018</a:t>
             </a:fld>
             <a:endParaRPr lang="en-US"/>
           </a:p>
@@ -5829,6 +5853,7 @@
           <a:p>
             <a:fld id="{E1619E6C-22A1-490A-A748-4B9E468C72BE}" type="slidenum">
               <a:rPr lang="en-US" smtClean="0"/>
+              <a:pPr/>
               <a:t>‹#›</a:t>
             </a:fld>
             <a:endParaRPr lang="en-US"/>
@@ -5962,7 +5987,8 @@
           <a:p>
             <a:fld id="{0D124DBC-6F7F-43B8-B6BB-3B500A0A09AB}" type="datetimeFigureOut">
               <a:rPr lang="en-US" smtClean="0"/>
-              <a:t>4/8/2018</a:t>
+              <a:pPr/>
+              <a:t>4/9/2018</a:t>
             </a:fld>
             <a:endParaRPr lang="en-US"/>
           </a:p>
@@ -6004,6 +6030,7 @@
           <a:p>
             <a:fld id="{E1619E6C-22A1-490A-A748-4B9E468C72BE}" type="slidenum">
               <a:rPr lang="en-US" smtClean="0"/>
+              <a:pPr/>
               <a:t>‹#›</a:t>
             </a:fld>
             <a:endParaRPr lang="en-US"/>
@@ -6127,7 +6154,8 @@
           <a:p>
             <a:fld id="{0D124DBC-6F7F-43B8-B6BB-3B500A0A09AB}" type="datetimeFigureOut">
               <a:rPr lang="en-US" smtClean="0"/>
-              <a:t>4/8/2018</a:t>
+              <a:pPr/>
+              <a:t>4/9/2018</a:t>
             </a:fld>
             <a:endParaRPr lang="en-US"/>
           </a:p>
@@ -6169,6 +6197,7 @@
           <a:p>
             <a:fld id="{E1619E6C-22A1-490A-A748-4B9E468C72BE}" type="slidenum">
               <a:rPr lang="en-US" smtClean="0"/>
+              <a:pPr/>
               <a:t>‹#›</a:t>
             </a:fld>
             <a:endParaRPr lang="en-US"/>
@@ -6368,7 +6397,8 @@
           <a:p>
             <a:fld id="{0D124DBC-6F7F-43B8-B6BB-3B500A0A09AB}" type="datetimeFigureOut">
               <a:rPr lang="en-US" smtClean="0"/>
-              <a:t>4/8/2018</a:t>
+              <a:pPr/>
+              <a:t>4/9/2018</a:t>
             </a:fld>
             <a:endParaRPr lang="en-US"/>
           </a:p>
@@ -6410,6 +6440,7 @@
           <a:p>
             <a:fld id="{E1619E6C-22A1-490A-A748-4B9E468C72BE}" type="slidenum">
               <a:rPr lang="en-US" smtClean="0"/>
+              <a:pPr/>
               <a:t>‹#›</a:t>
             </a:fld>
             <a:endParaRPr lang="en-US"/>
@@ -6651,7 +6682,8 @@
           <a:p>
             <a:fld id="{0D124DBC-6F7F-43B8-B6BB-3B500A0A09AB}" type="datetimeFigureOut">
               <a:rPr lang="en-US" smtClean="0"/>
-              <a:t>4/8/2018</a:t>
+              <a:pPr/>
+              <a:t>4/9/2018</a:t>
             </a:fld>
             <a:endParaRPr lang="en-US"/>
           </a:p>
@@ -6693,6 +6725,7 @@
           <a:p>
             <a:fld id="{E1619E6C-22A1-490A-A748-4B9E468C72BE}" type="slidenum">
               <a:rPr lang="en-US" smtClean="0"/>
+              <a:pPr/>
               <a:t>‹#›</a:t>
             </a:fld>
             <a:endParaRPr lang="en-US"/>
@@ -7068,7 +7101,8 @@
           <a:p>
             <a:fld id="{0D124DBC-6F7F-43B8-B6BB-3B500A0A09AB}" type="datetimeFigureOut">
               <a:rPr lang="en-US" smtClean="0"/>
-              <a:t>4/8/2018</a:t>
+              <a:pPr/>
+              <a:t>4/9/2018</a:t>
             </a:fld>
             <a:endParaRPr lang="en-US"/>
           </a:p>
@@ -7110,6 +7144,7 @@
           <a:p>
             <a:fld id="{E1619E6C-22A1-490A-A748-4B9E468C72BE}" type="slidenum">
               <a:rPr lang="en-US" smtClean="0"/>
+              <a:pPr/>
               <a:t>‹#›</a:t>
             </a:fld>
             <a:endParaRPr lang="en-US"/>
@@ -7181,7 +7216,8 @@
           <a:p>
             <a:fld id="{0D124DBC-6F7F-43B8-B6BB-3B500A0A09AB}" type="datetimeFigureOut">
               <a:rPr lang="en-US" smtClean="0"/>
-              <a:t>4/8/2018</a:t>
+              <a:pPr/>
+              <a:t>4/9/2018</a:t>
             </a:fld>
             <a:endParaRPr lang="en-US"/>
           </a:p>
@@ -7223,6 +7259,7 @@
           <a:p>
             <a:fld id="{E1619E6C-22A1-490A-A748-4B9E468C72BE}" type="slidenum">
               <a:rPr lang="en-US" smtClean="0"/>
+              <a:pPr/>
               <a:t>‹#›</a:t>
             </a:fld>
             <a:endParaRPr lang="en-US"/>
@@ -7271,7 +7308,8 @@
           <a:p>
             <a:fld id="{0D124DBC-6F7F-43B8-B6BB-3B500A0A09AB}" type="datetimeFigureOut">
               <a:rPr lang="en-US" smtClean="0"/>
-              <a:t>4/8/2018</a:t>
+              <a:pPr/>
+              <a:t>4/9/2018</a:t>
             </a:fld>
             <a:endParaRPr lang="en-US"/>
           </a:p>
@@ -7313,6 +7351,7 @@
           <a:p>
             <a:fld id="{E1619E6C-22A1-490A-A748-4B9E468C72BE}" type="slidenum">
               <a:rPr lang="en-US" smtClean="0"/>
+              <a:pPr/>
               <a:t>‹#›</a:t>
             </a:fld>
             <a:endParaRPr lang="en-US"/>
@@ -7543,7 +7582,8 @@
           <a:p>
             <a:fld id="{0D124DBC-6F7F-43B8-B6BB-3B500A0A09AB}" type="datetimeFigureOut">
               <a:rPr lang="en-US" smtClean="0"/>
-              <a:t>4/8/2018</a:t>
+              <a:pPr/>
+              <a:t>4/9/2018</a:t>
             </a:fld>
             <a:endParaRPr lang="en-US"/>
           </a:p>
@@ -7585,6 +7625,7 @@
           <a:p>
             <a:fld id="{E1619E6C-22A1-490A-A748-4B9E468C72BE}" type="slidenum">
               <a:rPr lang="en-US" smtClean="0"/>
+              <a:pPr/>
               <a:t>‹#›</a:t>
             </a:fld>
             <a:endParaRPr lang="en-US"/>
@@ -7791,7 +7832,8 @@
           <a:p>
             <a:fld id="{0D124DBC-6F7F-43B8-B6BB-3B500A0A09AB}" type="datetimeFigureOut">
               <a:rPr lang="en-US" smtClean="0"/>
-              <a:t>4/8/2018</a:t>
+              <a:pPr/>
+              <a:t>4/9/2018</a:t>
             </a:fld>
             <a:endParaRPr lang="en-US"/>
           </a:p>
@@ -7833,6 +7875,7 @@
           <a:p>
             <a:fld id="{E1619E6C-22A1-490A-A748-4B9E468C72BE}" type="slidenum">
               <a:rPr lang="en-US" smtClean="0"/>
+              <a:pPr/>
               <a:t>‹#›</a:t>
             </a:fld>
             <a:endParaRPr lang="en-US"/>
@@ -7999,7 +8042,8 @@
           <a:p>
             <a:fld id="{0D124DBC-6F7F-43B8-B6BB-3B500A0A09AB}" type="datetimeFigureOut">
               <a:rPr lang="en-US" smtClean="0"/>
-              <a:t>4/8/2018</a:t>
+              <a:pPr/>
+              <a:t>4/9/2018</a:t>
             </a:fld>
             <a:endParaRPr lang="en-US"/>
           </a:p>
@@ -8077,6 +8121,7 @@
           <a:p>
             <a:fld id="{E1619E6C-22A1-490A-A748-4B9E468C72BE}" type="slidenum">
               <a:rPr lang="en-US" smtClean="0"/>
+              <a:pPr/>
               <a:t>‹#›</a:t>
             </a:fld>
             <a:endParaRPr lang="en-US"/>
@@ -8415,7 +8460,7 @@
         </p:nvSpPr>
         <p:spPr>
           <a:xfrm>
-            <a:off x="1371600" y="3886200"/>
+            <a:off x="1285852" y="3286124"/>
             <a:ext cx="6400800" cy="828684"/>
           </a:xfrm>
         </p:spPr>
@@ -8432,7 +8477,7 @@
                   </a:schemeClr>
                 </a:solidFill>
               </a:rPr>
-              <a:t>Prepared By : Infosys</a:t>
+              <a:t>Topic : Repository Structure</a:t>
             </a:r>
             <a:endParaRPr lang="en-US" dirty="0">
               <a:solidFill>
@@ -8660,7 +8705,6 @@
               <a:rPr lang="en-US" sz="1600" dirty="0" smtClean="0"/>
               <a:t>If the feature is failure, delete the branch without merging into development.</a:t>
             </a:r>
-            <a:endParaRPr lang="en-US" sz="1600" dirty="0" smtClean="0"/>
           </a:p>
           <a:p>
             <a:pPr lvl="2">
@@ -8808,11 +8852,7 @@
             </a:pPr>
             <a:r>
               <a:rPr lang="en-US" sz="1600" dirty="0" smtClean="0"/>
-              <a:t>Once issue is fixed, merge fix in to Next production release and development branch </a:t>
-            </a:r>
-            <a:r>
-              <a:rPr lang="en-US" sz="1600" dirty="0" smtClean="0"/>
-              <a:t>(if development phase is going on).if production issue came during AIT phase, then fixed code should be merge with Release branch.</a:t>
+              <a:t>Once issue is fixed, merge fix in to Next production release and development branch (if development phase is going on).if production issue came during AIT phase, then fixed code should be merge with Release branch.</a:t>
             </a:r>
           </a:p>
           <a:p>
@@ -8829,15 +8869,7 @@
             </a:pPr>
             <a:r>
               <a:rPr lang="en-US" sz="1600" b="1" dirty="0" smtClean="0"/>
-              <a:t>Release Branch (During the First AIT – </a:t>
-            </a:r>
-            <a:r>
-              <a:rPr lang="en-US" sz="1600" b="1" dirty="0" smtClean="0"/>
-              <a:t>it is created</a:t>
-            </a:r>
-            <a:r>
-              <a:rPr lang="en-US" sz="1600" b="1" dirty="0" smtClean="0"/>
-              <a:t>)</a:t>
+              <a:t>Release Branch (During the First AIT – it is created)</a:t>
             </a:r>
           </a:p>
           <a:p>
@@ -8879,7 +8911,6 @@
               <a:rPr lang="en-US" sz="1600" dirty="0" smtClean="0"/>
               <a:t>Once, Production is done, merge release branch with development branch.</a:t>
             </a:r>
-            <a:endParaRPr lang="en-US" sz="1600" dirty="0" smtClean="0"/>
           </a:p>
           <a:p>
             <a:pPr lvl="2">
@@ -11454,7 +11485,6 @@
               <a:rPr lang="en-US" sz="2000" dirty="0" smtClean="0"/>
               <a:t>repositories.</a:t>
             </a:r>
-            <a:endParaRPr lang="en-US" sz="2000" dirty="0" smtClean="0"/>
           </a:p>
           <a:p>
             <a:pPr lvl="1" algn="just"/>
@@ -12370,7 +12400,7 @@
               <a:t>Are the multiple parts </a:t>
             </a:r>
             <a:r>
-              <a:rPr lang="en-US" sz="2000" i="1" dirty="0"/>
+              <a:rPr lang="en-US" sz="2100" dirty="0"/>
               <a:t>highly</a:t>
             </a:r>
             <a:r>
@@ -12535,11 +12565,6 @@
               </a:rPr>
               <a:t>Multirepo</a:t>
             </a:r>
-            <a:endParaRPr lang="en-US" sz="2000" b="1" dirty="0" smtClean="0">
-              <a:solidFill>
-                <a:srgbClr val="00B050"/>
-              </a:solidFill>
-            </a:endParaRPr>
           </a:p>
           <a:p>
             <a:r>

</xml_diff>